<commit_message>
svg stuff, and icon dic
</commit_message>
<xml_diff>
--- a/Page example.pptx
+++ b/Page example.pptx
@@ -131,7 +131,7 @@
   <pc:docChgLst>
     <pc:chgData name="Anders Lefdal Nordgård" userId="9410eb66-fcef-4e1f-8fc7-e7ae1b75011f" providerId="ADAL" clId="{08345630-0AE8-4841-A90C-C410E7BE7FFE}"/>
     <pc:docChg chg="undo custSel addSld delSld modSld sldOrd">
-      <pc:chgData name="Anders Lefdal Nordgård" userId="9410eb66-fcef-4e1f-8fc7-e7ae1b75011f" providerId="ADAL" clId="{08345630-0AE8-4841-A90C-C410E7BE7FFE}" dt="2022-10-16T15:01:50.214" v="1531" actId="20577"/>
+      <pc:chgData name="Anders Lefdal Nordgård" userId="9410eb66-fcef-4e1f-8fc7-e7ae1b75011f" providerId="ADAL" clId="{08345630-0AE8-4841-A90C-C410E7BE7FFE}" dt="2022-11-07T20:12:54.260" v="1532" actId="1076"/>
       <pc:docMkLst>
         <pc:docMk/>
       </pc:docMkLst>
@@ -5454,7 +5454,7 @@
         </pc:picChg>
       </pc:sldChg>
       <pc:sldChg chg="addSp delSp modSp add mod">
-        <pc:chgData name="Anders Lefdal Nordgård" userId="9410eb66-fcef-4e1f-8fc7-e7ae1b75011f" providerId="ADAL" clId="{08345630-0AE8-4841-A90C-C410E7BE7FFE}" dt="2022-10-16T14:36:26.661" v="1501" actId="1076"/>
+        <pc:chgData name="Anders Lefdal Nordgård" userId="9410eb66-fcef-4e1f-8fc7-e7ae1b75011f" providerId="ADAL" clId="{08345630-0AE8-4841-A90C-C410E7BE7FFE}" dt="2022-11-07T20:12:54.260" v="1532" actId="1076"/>
         <pc:sldMkLst>
           <pc:docMk/>
           <pc:sldMk cId="2910152414" sldId="265"/>
@@ -5476,7 +5476,7 @@
           </ac:picMkLst>
         </pc:picChg>
         <pc:picChg chg="add del mod modCrop">
-          <ac:chgData name="Anders Lefdal Nordgård" userId="9410eb66-fcef-4e1f-8fc7-e7ae1b75011f" providerId="ADAL" clId="{08345630-0AE8-4841-A90C-C410E7BE7FFE}" dt="2022-10-16T14:36:04.654" v="1499" actId="732"/>
+          <ac:chgData name="Anders Lefdal Nordgård" userId="9410eb66-fcef-4e1f-8fc7-e7ae1b75011f" providerId="ADAL" clId="{08345630-0AE8-4841-A90C-C410E7BE7FFE}" dt="2022-11-07T20:12:54.260" v="1532" actId="1076"/>
           <ac:picMkLst>
             <pc:docMk/>
             <pc:sldMk cId="2910152414" sldId="265"/>
@@ -6612,7 +6612,7 @@
           <a:p>
             <a:fld id="{1648DF15-F5BB-4EB2-B277-DA7ED6EDBD95}" type="datetimeFigureOut">
               <a:rPr lang="en-GB" smtClean="0"/>
-              <a:t>2022-10-16</a:t>
+              <a:t>2022-11-07</a:t>
             </a:fld>
             <a:endParaRPr lang="en-GB"/>
           </a:p>
@@ -6812,7 +6812,7 @@
           <a:p>
             <a:fld id="{1648DF15-F5BB-4EB2-B277-DA7ED6EDBD95}" type="datetimeFigureOut">
               <a:rPr lang="en-GB" smtClean="0"/>
-              <a:t>2022-10-16</a:t>
+              <a:t>2022-11-07</a:t>
             </a:fld>
             <a:endParaRPr lang="en-GB"/>
           </a:p>
@@ -7022,7 +7022,7 @@
           <a:p>
             <a:fld id="{1648DF15-F5BB-4EB2-B277-DA7ED6EDBD95}" type="datetimeFigureOut">
               <a:rPr lang="en-GB" smtClean="0"/>
-              <a:t>2022-10-16</a:t>
+              <a:t>2022-11-07</a:t>
             </a:fld>
             <a:endParaRPr lang="en-GB"/>
           </a:p>
@@ -7222,7 +7222,7 @@
           <a:p>
             <a:fld id="{1648DF15-F5BB-4EB2-B277-DA7ED6EDBD95}" type="datetimeFigureOut">
               <a:rPr lang="en-GB" smtClean="0"/>
-              <a:t>2022-10-16</a:t>
+              <a:t>2022-11-07</a:t>
             </a:fld>
             <a:endParaRPr lang="en-GB"/>
           </a:p>
@@ -7498,7 +7498,7 @@
           <a:p>
             <a:fld id="{1648DF15-F5BB-4EB2-B277-DA7ED6EDBD95}" type="datetimeFigureOut">
               <a:rPr lang="en-GB" smtClean="0"/>
-              <a:t>2022-10-16</a:t>
+              <a:t>2022-11-07</a:t>
             </a:fld>
             <a:endParaRPr lang="en-GB"/>
           </a:p>
@@ -7766,7 +7766,7 @@
           <a:p>
             <a:fld id="{1648DF15-F5BB-4EB2-B277-DA7ED6EDBD95}" type="datetimeFigureOut">
               <a:rPr lang="en-GB" smtClean="0"/>
-              <a:t>2022-10-16</a:t>
+              <a:t>2022-11-07</a:t>
             </a:fld>
             <a:endParaRPr lang="en-GB"/>
           </a:p>
@@ -8181,7 +8181,7 @@
           <a:p>
             <a:fld id="{1648DF15-F5BB-4EB2-B277-DA7ED6EDBD95}" type="datetimeFigureOut">
               <a:rPr lang="en-GB" smtClean="0"/>
-              <a:t>2022-10-16</a:t>
+              <a:t>2022-11-07</a:t>
             </a:fld>
             <a:endParaRPr lang="en-GB"/>
           </a:p>
@@ -8323,7 +8323,7 @@
           <a:p>
             <a:fld id="{1648DF15-F5BB-4EB2-B277-DA7ED6EDBD95}" type="datetimeFigureOut">
               <a:rPr lang="en-GB" smtClean="0"/>
-              <a:t>2022-10-16</a:t>
+              <a:t>2022-11-07</a:t>
             </a:fld>
             <a:endParaRPr lang="en-GB"/>
           </a:p>
@@ -8436,7 +8436,7 @@
           <a:p>
             <a:fld id="{1648DF15-F5BB-4EB2-B277-DA7ED6EDBD95}" type="datetimeFigureOut">
               <a:rPr lang="en-GB" smtClean="0"/>
-              <a:t>2022-10-16</a:t>
+              <a:t>2022-11-07</a:t>
             </a:fld>
             <a:endParaRPr lang="en-GB"/>
           </a:p>
@@ -8749,7 +8749,7 @@
           <a:p>
             <a:fld id="{1648DF15-F5BB-4EB2-B277-DA7ED6EDBD95}" type="datetimeFigureOut">
               <a:rPr lang="en-GB" smtClean="0"/>
-              <a:t>2022-10-16</a:t>
+              <a:t>2022-11-07</a:t>
             </a:fld>
             <a:endParaRPr lang="en-GB"/>
           </a:p>
@@ -9038,7 +9038,7 @@
           <a:p>
             <a:fld id="{1648DF15-F5BB-4EB2-B277-DA7ED6EDBD95}" type="datetimeFigureOut">
               <a:rPr lang="en-GB" smtClean="0"/>
-              <a:t>2022-10-16</a:t>
+              <a:t>2022-11-07</a:t>
             </a:fld>
             <a:endParaRPr lang="en-GB"/>
           </a:p>
@@ -9281,7 +9281,7 @@
           <a:p>
             <a:fld id="{1648DF15-F5BB-4EB2-B277-DA7ED6EDBD95}" type="datetimeFigureOut">
               <a:rPr lang="en-GB" smtClean="0"/>
-              <a:t>2022-10-16</a:t>
+              <a:t>2022-11-07</a:t>
             </a:fld>
             <a:endParaRPr lang="en-GB"/>
           </a:p>
@@ -10453,7 +10453,7 @@
         </p:blipFill>
         <p:spPr>
           <a:xfrm>
-            <a:off x="491066" y="457201"/>
+            <a:off x="587318" y="457200"/>
             <a:ext cx="11514666" cy="6400800"/>
           </a:xfrm>
           <a:prstGeom prst="rect">

</xml_diff>